<commit_message>
small correction in agenda
</commit_message>
<xml_diff>
--- a/meetings/2019_12_12_midterm/midterm_accumulation.pptx
+++ b/meetings/2019_12_12_midterm/midterm_accumulation.pptx
@@ -3823,7 +3823,7 @@
             </a:pPr>
             <a:r>
               <a:rPr lang="en-US" dirty="0"/>
-              <a:t>History and Architecture and Net</a:t>
+              <a:t>History and Architecture</a:t>
             </a:r>
           </a:p>
           <a:p>
@@ -4084,7 +4084,7 @@
             </a:pPr>
             <a:r>
               <a:rPr lang="en-US" dirty="0"/>
-              <a:t>History and Architecture and Net</a:t>
+              <a:t>History and Architecture </a:t>
             </a:r>
           </a:p>
         </p:txBody>

</xml_diff>

<commit_message>
updatet papers updatet presentation
</commit_message>
<xml_diff>
--- a/meetings/2019_12_12_midterm/midterm_accumulation.pptx
+++ b/meetings/2019_12_12_midterm/midterm_accumulation.pptx
@@ -5,20 +5,20 @@
     <p:sldMasterId id="2147483648" r:id="rId1"/>
   </p:sldMasterIdLst>
   <p:notesMasterIdLst>
-    <p:notesMasterId r:id="rId10"/>
+    <p:notesMasterId r:id="rId11"/>
   </p:notesMasterIdLst>
   <p:handoutMasterIdLst>
-    <p:handoutMasterId r:id="rId11"/>
+    <p:handoutMasterId r:id="rId12"/>
   </p:handoutMasterIdLst>
   <p:sldIdLst>
-    <p:sldId id="256" r:id="rId2"/>
-    <p:sldId id="257" r:id="rId3"/>
-    <p:sldId id="258" r:id="rId4"/>
-    <p:sldId id="259" r:id="rId5"/>
-    <p:sldId id="260" r:id="rId6"/>
-    <p:sldId id="261" r:id="rId7"/>
-    <p:sldId id="262" r:id="rId8"/>
-    <p:sldId id="263" r:id="rId9"/>
+    <p:sldId id="256" r:id="rId3"/>
+    <p:sldId id="257" r:id="rId4"/>
+    <p:sldId id="258" r:id="rId5"/>
+    <p:sldId id="259" r:id="rId6"/>
+    <p:sldId id="260" r:id="rId7"/>
+    <p:sldId id="261" r:id="rId8"/>
+    <p:sldId id="262" r:id="rId9"/>
+    <p:sldId id="263" r:id="rId10"/>
   </p:sldIdLst>
   <p:sldSz cx="9144000" cy="6858000" type="screen4x3"/>
   <p:notesSz cx="6858000" cy="9144000"/>
@@ -37,7 +37,7 @@
         <a:solidFill>
           <a:schemeClr val="tx1"/>
         </a:solidFill>
-        <a:latin typeface="Arial" panose="020B0604020202020204" pitchFamily="34" charset="0"/>
+        <a:latin typeface="Arial" panose="020B0604020202090204" pitchFamily="34" charset="0"/>
         <a:ea typeface="+mn-ea"/>
         <a:cs typeface="+mn-cs"/>
       </a:defRPr>
@@ -53,7 +53,7 @@
         <a:solidFill>
           <a:schemeClr val="tx1"/>
         </a:solidFill>
-        <a:latin typeface="Arial" panose="020B0604020202020204" pitchFamily="34" charset="0"/>
+        <a:latin typeface="Arial" panose="020B0604020202090204" pitchFamily="34" charset="0"/>
         <a:ea typeface="+mn-ea"/>
         <a:cs typeface="+mn-cs"/>
       </a:defRPr>
@@ -69,7 +69,7 @@
         <a:solidFill>
           <a:schemeClr val="tx1"/>
         </a:solidFill>
-        <a:latin typeface="Arial" panose="020B0604020202020204" pitchFamily="34" charset="0"/>
+        <a:latin typeface="Arial" panose="020B0604020202090204" pitchFamily="34" charset="0"/>
         <a:ea typeface="+mn-ea"/>
         <a:cs typeface="+mn-cs"/>
       </a:defRPr>
@@ -85,7 +85,7 @@
         <a:solidFill>
           <a:schemeClr val="tx1"/>
         </a:solidFill>
-        <a:latin typeface="Arial" panose="020B0604020202020204" pitchFamily="34" charset="0"/>
+        <a:latin typeface="Arial" panose="020B0604020202090204" pitchFamily="34" charset="0"/>
         <a:ea typeface="+mn-ea"/>
         <a:cs typeface="+mn-cs"/>
       </a:defRPr>
@@ -101,7 +101,7 @@
         <a:solidFill>
           <a:schemeClr val="tx1"/>
         </a:solidFill>
-        <a:latin typeface="Arial" panose="020B0604020202020204" pitchFamily="34" charset="0"/>
+        <a:latin typeface="Arial" panose="020B0604020202090204" pitchFamily="34" charset="0"/>
         <a:ea typeface="+mn-ea"/>
         <a:cs typeface="+mn-cs"/>
       </a:defRPr>
@@ -111,7 +111,7 @@
         <a:solidFill>
           <a:schemeClr val="tx1"/>
         </a:solidFill>
-        <a:latin typeface="Arial" panose="020B0604020202020204" pitchFamily="34" charset="0"/>
+        <a:latin typeface="Arial" panose="020B0604020202090204" pitchFamily="34" charset="0"/>
         <a:ea typeface="+mn-ea"/>
         <a:cs typeface="+mn-cs"/>
       </a:defRPr>
@@ -121,7 +121,7 @@
         <a:solidFill>
           <a:schemeClr val="tx1"/>
         </a:solidFill>
-        <a:latin typeface="Arial" panose="020B0604020202020204" pitchFamily="34" charset="0"/>
+        <a:latin typeface="Arial" panose="020B0604020202090204" pitchFamily="34" charset="0"/>
         <a:ea typeface="+mn-ea"/>
         <a:cs typeface="+mn-cs"/>
       </a:defRPr>
@@ -131,7 +131,7 @@
         <a:solidFill>
           <a:schemeClr val="tx1"/>
         </a:solidFill>
-        <a:latin typeface="Arial" panose="020B0604020202020204" pitchFamily="34" charset="0"/>
+        <a:latin typeface="Arial" panose="020B0604020202090204" pitchFamily="34" charset="0"/>
         <a:ea typeface="+mn-ea"/>
         <a:cs typeface="+mn-cs"/>
       </a:defRPr>
@@ -141,31 +141,12 @@
         <a:solidFill>
           <a:schemeClr val="tx1"/>
         </a:solidFill>
-        <a:latin typeface="Arial" panose="020B0604020202020204" pitchFamily="34" charset="0"/>
+        <a:latin typeface="Arial" panose="020B0604020202090204" pitchFamily="34" charset="0"/>
         <a:ea typeface="+mn-ea"/>
         <a:cs typeface="+mn-cs"/>
       </a:defRPr>
     </a:lvl9pPr>
   </p:defaultTextStyle>
-  <p:extLst>
-    <p:ext uri="{EFAFB233-063F-42B5-8137-9DF3F51BA10A}">
-      <p15:sldGuideLst xmlns:p15="http://schemas.microsoft.com/office/powerpoint/2012/main">
-        <p15:guide id="1" orient="horz" pos="2160">
-          <p15:clr>
-            <a:srgbClr val="A4A3A4"/>
-          </p15:clr>
-        </p15:guide>
-        <p15:guide id="2" pos="2880">
-          <p15:clr>
-            <a:srgbClr val="A4A3A4"/>
-          </p15:clr>
-        </p15:guide>
-      </p15:sldGuideLst>
-    </p:ext>
-    <p:ext uri="{2D200454-40CA-4A62-9FC3-DE9A4176ACB9}">
-      <p15:notesGuideLst xmlns:p15="http://schemas.microsoft.com/office/powerpoint/2012/main"/>
-    </p:ext>
-  </p:extLst>
 </p:presentation>
 </file>
 
@@ -273,7 +254,6 @@
           <a:p>
             <a:fld id="{A32DC80D-291A-4ABB-A78B-0417274A267C}" type="datetime4">
               <a:rPr lang="de-DE"/>
-              <a:t>3. Dezember 2019</a:t>
             </a:fld>
             <a:endParaRPr lang="de-DE"/>
           </a:p>
@@ -318,6 +298,7 @@
               <a:rPr lang="de-DE"/>
               <a:t>|  </a:t>
             </a:r>
+            <a:endParaRPr lang="de-DE"/>
           </a:p>
         </p:txBody>
       </p:sp>
@@ -362,7 +343,6 @@
             </a:r>
             <a:fld id="{C7CC2173-B0D1-45F1-9D54-E33B7353DA19}" type="slidenum">
               <a:rPr lang="de-DE"/>
-              <a:t>‹Nr.›</a:t>
             </a:fld>
             <a:endParaRPr lang="de-DE"/>
           </a:p>
@@ -377,7 +357,7 @@
           <p:nvPr/>
         </p:nvPicPr>
         <p:blipFill>
-          <a:blip r:embed="rId2" cstate="print"/>
+          <a:blip r:embed="rId1" cstate="print"/>
           <a:srcRect/>
           <a:stretch>
             <a:fillRect/>
@@ -566,7 +546,7 @@
           <p:nvPr/>
         </p:nvPicPr>
         <p:blipFill>
-          <a:blip r:embed="rId2"/>
+          <a:blip r:embed="rId1"/>
           <a:srcRect/>
           <a:stretch>
             <a:fillRect/>
@@ -623,7 +603,6 @@
           <a:p>
             <a:fld id="{065B079B-E513-489A-8A1B-D7C78493EA86}" type="datetime4">
               <a:rPr lang="de-DE"/>
-              <a:t>3. Dezember 2019</a:t>
             </a:fld>
             <a:endParaRPr lang="de-DE"/>
           </a:p>
@@ -691,6 +670,7 @@
               <a:rPr lang="de-DE"/>
               <a:t>Textmasterformate durch Klicken bearbeiten</a:t>
             </a:r>
+            <a:endParaRPr lang="de-DE"/>
           </a:p>
           <a:p>
             <a:pPr lvl="1"/>
@@ -698,6 +678,7 @@
               <a:rPr lang="de-DE"/>
               <a:t>Zweite Ebene</a:t>
             </a:r>
+            <a:endParaRPr lang="de-DE"/>
           </a:p>
           <a:p>
             <a:pPr lvl="2"/>
@@ -705,6 +686,7 @@
               <a:rPr lang="de-DE"/>
               <a:t>Dritte Ebene</a:t>
             </a:r>
+            <a:endParaRPr lang="de-DE"/>
           </a:p>
           <a:p>
             <a:pPr lvl="3"/>
@@ -712,6 +694,7 @@
               <a:rPr lang="de-DE"/>
               <a:t>Vierte Ebene</a:t>
             </a:r>
+            <a:endParaRPr lang="de-DE"/>
           </a:p>
           <a:p>
             <a:pPr lvl="4"/>
@@ -719,6 +702,7 @@
               <a:rPr lang="de-DE"/>
               <a:t>Fünfte Ebene</a:t>
             </a:r>
+            <a:endParaRPr lang="de-DE"/>
           </a:p>
         </p:txBody>
       </p:sp>
@@ -764,6 +748,7 @@
               <a:rPr lang="de-DE"/>
               <a:t>|  </a:t>
             </a:r>
+            <a:endParaRPr lang="de-DE"/>
           </a:p>
         </p:txBody>
       </p:sp>
@@ -811,7 +796,6 @@
             </a:r>
             <a:fld id="{C36AA9A4-5D0B-4134-89A6-D8B9DAA4F25C}" type="slidenum">
               <a:rPr lang="de-DE"/>
-              <a:t>‹Nr.›</a:t>
             </a:fld>
             <a:endParaRPr lang="de-DE"/>
           </a:p>
@@ -1150,7 +1134,7 @@
 </file>
 
 <file path=ppt/slideLayouts/slideLayout1.xml><?xml version="1.0" encoding="utf-8"?>
-<p:sldLayout xmlns:a="http://schemas.openxmlformats.org/drawingml/2006/main" xmlns:r="http://schemas.openxmlformats.org/officeDocument/2006/relationships" xmlns:p="http://schemas.openxmlformats.org/presentationml/2006/main" showMasterSp="0" preserve="1" userDrawn="1">
+<p:sldLayout xmlns:a="http://schemas.openxmlformats.org/drawingml/2006/main" xmlns:r="http://schemas.openxmlformats.org/officeDocument/2006/relationships" xmlns:p="http://schemas.openxmlformats.org/presentationml/2006/main" preserve="1" showMasterSp="0" userDrawn="1">
   <p:cSld name="Titelfolie">
     <p:spTree>
       <p:nvGrpSpPr>
@@ -1237,6 +1221,7 @@
               <a:rPr lang="de-DE" dirty="0"/>
               <a:t>Formatvorlage des Untertitelmasters durch Klicken bearbeiten</a:t>
             </a:r>
+            <a:endParaRPr lang="de-DE" dirty="0"/>
           </a:p>
         </p:txBody>
       </p:sp>
@@ -1429,6 +1414,7 @@
               <a:rPr lang="de-DE" dirty="0"/>
               <a:t>Titelmasterformat durch Klicken bearbeiten</a:t>
             </a:r>
+            <a:endParaRPr lang="de-DE" dirty="0"/>
           </a:p>
         </p:txBody>
       </p:sp>
@@ -1484,9 +1470,8 @@
                 <a:uFillTx/>
                 <a:latin typeface="+mn-lt"/>
                 <a:ea typeface="+mn-ea"/>
-                <a:cs typeface="Tahoma" panose="020B0604030504040204" pitchFamily="34" charset="0"/>
+                <a:cs typeface="Tahoma" panose="020B0804030504040204" pitchFamily="34" charset="0"/>
               </a:rPr>
-              <a:t>03.12.2019</a:t>
             </a:fld>
             <a:r>
               <a:rPr kumimoji="0" lang="de-DE" sz="1000" b="0" i="0" u="none" strike="noStrike" kern="1200" cap="none" spc="0" normalizeH="0" baseline="0" noProof="0" dirty="0">
@@ -1501,7 +1486,7 @@
                 <a:uFillTx/>
                 <a:latin typeface="+mn-lt"/>
                 <a:ea typeface="+mn-ea"/>
-                <a:cs typeface="Tahoma" panose="020B0604030504040204" pitchFamily="34" charset="0"/>
+                <a:cs typeface="Tahoma" panose="020B0804030504040204" pitchFamily="34" charset="0"/>
               </a:rPr>
               <a:t>  |  </a:t>
             </a:r>
@@ -1514,7 +1499,7 @@
                 <a:uLnTx/>
                 <a:uFillTx/>
                 <a:latin typeface="+mn-lt"/>
-                <a:cs typeface="Tahoma" panose="020B0604030504040204" pitchFamily="34" charset="0"/>
+                <a:cs typeface="Tahoma" panose="020B0804030504040204" pitchFamily="34" charset="0"/>
                 <a:sym typeface="+mn-ea"/>
               </a:rPr>
               <a:t>Fachbereich </a:t>
@@ -1528,7 +1513,7 @@
                 <a:uLnTx/>
                 <a:uFillTx/>
                 <a:latin typeface="+mn-lt"/>
-                <a:cs typeface="Tahoma" panose="020B0604030504040204" pitchFamily="34" charset="0"/>
+                <a:cs typeface="Tahoma" panose="020B0804030504040204" pitchFamily="34" charset="0"/>
                 <a:sym typeface="+mn-ea"/>
               </a:rPr>
               <a:t>20 </a:t>
@@ -1542,7 +1527,7 @@
                 <a:uLnTx/>
                 <a:uFillTx/>
                 <a:latin typeface="+mn-lt"/>
-                <a:cs typeface="Tahoma" panose="020B0604030504040204" pitchFamily="34" charset="0"/>
+                <a:cs typeface="Tahoma" panose="020B0804030504040204" pitchFamily="34" charset="0"/>
                 <a:sym typeface="+mn-ea"/>
               </a:rPr>
               <a:t>|  Institut Visual Inference La</a:t>
@@ -1556,7 +1541,7 @@
                 <a:uLnTx/>
                 <a:uFillTx/>
                 <a:latin typeface="+mn-lt"/>
-                <a:cs typeface="Tahoma" panose="020B0604030504040204" pitchFamily="34" charset="0"/>
+                <a:cs typeface="Tahoma" panose="020B0804030504040204" pitchFamily="34" charset="0"/>
                 <a:sym typeface="+mn-ea"/>
               </a:rPr>
               <a:t>b</a:t>
@@ -1570,7 +1555,7 @@
                 <a:uLnTx/>
                 <a:uFillTx/>
                 <a:latin typeface="+mn-lt"/>
-                <a:cs typeface="Tahoma" panose="020B0604030504040204" pitchFamily="34" charset="0"/>
+                <a:cs typeface="Tahoma" panose="020B0804030504040204" pitchFamily="34" charset="0"/>
                 <a:sym typeface="+mn-ea"/>
               </a:rPr>
               <a:t> |  Prof. </a:t>
@@ -1584,7 +1569,7 @@
                 <a:uLnTx/>
                 <a:uFillTx/>
                 <a:latin typeface="+mn-lt"/>
-                <a:cs typeface="Tahoma" panose="020B0604030504040204" pitchFamily="34" charset="0"/>
+                <a:cs typeface="Tahoma" panose="020B0804030504040204" pitchFamily="34" charset="0"/>
                 <a:sym typeface="+mn-ea"/>
               </a:rPr>
               <a:t>Stefan Roth </a:t>
@@ -1598,7 +1583,7 @@
                 <a:uLnTx/>
                 <a:uFillTx/>
                 <a:latin typeface="+mn-lt"/>
-                <a:cs typeface="Tahoma" panose="020B0604030504040204" pitchFamily="34" charset="0"/>
+                <a:cs typeface="Tahoma" panose="020B0804030504040204" pitchFamily="34" charset="0"/>
                 <a:sym typeface="+mn-ea"/>
               </a:rPr>
               <a:t>|  </a:t>
@@ -1616,10 +1601,9 @@
                 <a:uFillTx/>
                 <a:latin typeface="+mn-lt"/>
                 <a:ea typeface="+mn-ea"/>
-                <a:cs typeface="Tahoma" panose="020B0604030504040204" pitchFamily="34" charset="0"/>
+                <a:cs typeface="Tahoma" panose="020B0804030504040204" pitchFamily="34" charset="0"/>
                 <a:sym typeface="+mn-ea"/>
               </a:rPr>
-              <a:t>‹Nr.›</a:t>
             </a:fld>
             <a:endParaRPr kumimoji="0" lang="de-DE" sz="1000" b="0" i="0" u="none" strike="noStrike" kern="1200" cap="none" spc="0" normalizeH="0" baseline="0" noProof="0" dirty="0">
               <a:ln>
@@ -1633,7 +1617,7 @@
               <a:uFillTx/>
               <a:latin typeface="+mn-lt"/>
               <a:ea typeface="+mn-ea"/>
-              <a:cs typeface="Tahoma" panose="020B0604030504040204" pitchFamily="34" charset="0"/>
+              <a:cs typeface="Tahoma" panose="020B0804030504040204" pitchFamily="34" charset="0"/>
             </a:endParaRPr>
           </a:p>
           <a:p>
@@ -1665,7 +1649,7 @@
               <a:uFillTx/>
               <a:latin typeface="+mn-lt"/>
               <a:ea typeface="+mn-ea"/>
-              <a:cs typeface="Tahoma" panose="020B0604030504040204" pitchFamily="34" charset="0"/>
+              <a:cs typeface="Tahoma" panose="020B0804030504040204" pitchFamily="34" charset="0"/>
             </a:endParaRPr>
           </a:p>
         </p:txBody>
@@ -1738,6 +1722,7 @@
               <a:rPr lang="de-DE"/>
               <a:t>Titelmasterformat durch Klicken bearbeiten</a:t>
             </a:r>
+            <a:endParaRPr lang="de-DE"/>
           </a:p>
         </p:txBody>
       </p:sp>
@@ -1766,6 +1751,7 @@
               <a:rPr lang="de-DE" dirty="0"/>
               <a:t>Textmasterformate durch Klicken bearbeiten</a:t>
             </a:r>
+            <a:endParaRPr lang="de-DE" dirty="0"/>
           </a:p>
           <a:p>
             <a:pPr lvl="1"/>
@@ -1773,6 +1759,7 @@
               <a:rPr lang="de-DE" dirty="0"/>
               <a:t>Zweite Ebene</a:t>
             </a:r>
+            <a:endParaRPr lang="de-DE" dirty="0"/>
           </a:p>
           <a:p>
             <a:pPr lvl="2"/>
@@ -1780,6 +1767,7 @@
               <a:rPr lang="de-DE" dirty="0"/>
               <a:t>Dritte Ebene</a:t>
             </a:r>
+            <a:endParaRPr lang="de-DE" dirty="0"/>
           </a:p>
           <a:p>
             <a:pPr lvl="3"/>
@@ -1787,6 +1775,7 @@
               <a:rPr lang="de-DE" dirty="0"/>
               <a:t>Vierte Ebene</a:t>
             </a:r>
+            <a:endParaRPr lang="de-DE" dirty="0"/>
           </a:p>
           <a:p>
             <a:pPr lvl="4"/>
@@ -1794,6 +1783,7 @@
               <a:rPr lang="de-DE" dirty="0"/>
               <a:t>Fünfte Ebene</a:t>
             </a:r>
+            <a:endParaRPr lang="de-DE" dirty="0"/>
           </a:p>
         </p:txBody>
       </p:sp>
@@ -1850,6 +1840,7 @@
               <a:rPr lang="de-DE" dirty="0"/>
               <a:t>Titelmasterformat durch Klicken bearbeiten</a:t>
             </a:r>
+            <a:endParaRPr lang="de-DE" dirty="0"/>
           </a:p>
         </p:txBody>
       </p:sp>
@@ -1915,6 +1906,7 @@
               <a:rPr lang="de-DE"/>
               <a:t>Textmasterformate durch Klicken bearbeiten</a:t>
             </a:r>
+            <a:endParaRPr lang="de-DE"/>
           </a:p>
         </p:txBody>
       </p:sp>
@@ -1962,6 +1954,7 @@
               <a:rPr lang="de-DE"/>
               <a:t>Titelmasterformat durch Klicken bearbeiten</a:t>
             </a:r>
+            <a:endParaRPr lang="de-DE"/>
           </a:p>
         </p:txBody>
       </p:sp>
@@ -2018,6 +2011,7 @@
               <a:rPr lang="de-DE" dirty="0"/>
               <a:t>Textmasterformate durch Klicken bearbeiten</a:t>
             </a:r>
+            <a:endParaRPr lang="de-DE" dirty="0"/>
           </a:p>
           <a:p>
             <a:pPr lvl="1"/>
@@ -2025,6 +2019,7 @@
               <a:rPr lang="de-DE" dirty="0"/>
               <a:t>Zweite Ebene</a:t>
             </a:r>
+            <a:endParaRPr lang="de-DE" dirty="0"/>
           </a:p>
           <a:p>
             <a:pPr lvl="2"/>
@@ -2032,6 +2027,7 @@
               <a:rPr lang="de-DE" dirty="0"/>
               <a:t>Dritte Ebene</a:t>
             </a:r>
+            <a:endParaRPr lang="de-DE" dirty="0"/>
           </a:p>
           <a:p>
             <a:pPr lvl="3"/>
@@ -2039,6 +2035,7 @@
               <a:rPr lang="de-DE" dirty="0"/>
               <a:t>Vierte Ebene</a:t>
             </a:r>
+            <a:endParaRPr lang="de-DE" dirty="0"/>
           </a:p>
           <a:p>
             <a:pPr lvl="4"/>
@@ -2046,6 +2043,7 @@
               <a:rPr lang="de-DE" dirty="0"/>
               <a:t>Fünfte Ebene</a:t>
             </a:r>
+            <a:endParaRPr lang="de-DE" dirty="0"/>
           </a:p>
         </p:txBody>
       </p:sp>
@@ -2102,6 +2100,7 @@
               <a:rPr lang="de-DE" dirty="0"/>
               <a:t>Textmasterformate durch Klicken bearbeiten</a:t>
             </a:r>
+            <a:endParaRPr lang="de-DE" dirty="0"/>
           </a:p>
           <a:p>
             <a:pPr lvl="1"/>
@@ -2109,6 +2108,7 @@
               <a:rPr lang="de-DE" dirty="0"/>
               <a:t>Zweite Ebene</a:t>
             </a:r>
+            <a:endParaRPr lang="de-DE" dirty="0"/>
           </a:p>
           <a:p>
             <a:pPr lvl="2"/>
@@ -2116,6 +2116,7 @@
               <a:rPr lang="de-DE" dirty="0"/>
               <a:t>Dritte Ebene</a:t>
             </a:r>
+            <a:endParaRPr lang="de-DE" dirty="0"/>
           </a:p>
           <a:p>
             <a:pPr lvl="3"/>
@@ -2123,6 +2124,7 @@
               <a:rPr lang="de-DE" dirty="0"/>
               <a:t>Vierte Ebene</a:t>
             </a:r>
+            <a:endParaRPr lang="de-DE" dirty="0"/>
           </a:p>
           <a:p>
             <a:pPr lvl="4"/>
@@ -2130,6 +2132,7 @@
               <a:rPr lang="de-DE" dirty="0"/>
               <a:t>Fünfte Ebene</a:t>
             </a:r>
+            <a:endParaRPr lang="de-DE" dirty="0"/>
           </a:p>
         </p:txBody>
       </p:sp>
@@ -2177,6 +2180,7 @@
               <a:rPr lang="de-DE" dirty="0"/>
               <a:t>Titelmasterformat durch Klicken bearbeiten</a:t>
             </a:r>
+            <a:endParaRPr lang="de-DE" dirty="0"/>
           </a:p>
         </p:txBody>
       </p:sp>
@@ -2283,6 +2287,7 @@
               <a:rPr lang="de-DE" dirty="0"/>
               <a:t>Textmasterformate durch Klicken bearbeiten</a:t>
             </a:r>
+            <a:endParaRPr lang="de-DE" dirty="0"/>
           </a:p>
           <a:p>
             <a:pPr lvl="1"/>
@@ -2290,6 +2295,7 @@
               <a:rPr lang="de-DE" dirty="0"/>
               <a:t>Zweite Ebene</a:t>
             </a:r>
+            <a:endParaRPr lang="de-DE" dirty="0"/>
           </a:p>
           <a:p>
             <a:pPr lvl="2"/>
@@ -2297,6 +2303,7 @@
               <a:rPr lang="de-DE" dirty="0"/>
               <a:t>Dritte Ebene</a:t>
             </a:r>
+            <a:endParaRPr lang="de-DE" dirty="0"/>
           </a:p>
           <a:p>
             <a:pPr lvl="3"/>
@@ -2304,6 +2311,7 @@
               <a:rPr lang="de-DE" dirty="0"/>
               <a:t>Vierte Ebene</a:t>
             </a:r>
+            <a:endParaRPr lang="de-DE" dirty="0"/>
           </a:p>
           <a:p>
             <a:pPr lvl="4"/>
@@ -2311,6 +2319,7 @@
               <a:rPr lang="de-DE" dirty="0"/>
               <a:t>Fünfte Ebene</a:t>
             </a:r>
+            <a:endParaRPr lang="de-DE" dirty="0"/>
           </a:p>
         </p:txBody>
       </p:sp>
@@ -2376,6 +2385,7 @@
               <a:rPr lang="de-DE" dirty="0"/>
               <a:t>Textmasterformate durch Klicken bearbeiten</a:t>
             </a:r>
+            <a:endParaRPr lang="de-DE" dirty="0"/>
           </a:p>
         </p:txBody>
       </p:sp>
@@ -2403,6 +2413,7 @@
               <a:rPr lang="de-DE"/>
               <a:t>Titelmasterformat durch Klicken bearbeiten</a:t>
             </a:r>
+            <a:endParaRPr lang="de-DE"/>
           </a:p>
         </p:txBody>
       </p:sp>
@@ -2459,6 +2470,7 @@
               <a:rPr lang="de-DE"/>
               <a:t>Titelmasterformat durch Klicken bearbeiten</a:t>
             </a:r>
+            <a:endParaRPr lang="de-DE"/>
           </a:p>
         </p:txBody>
       </p:sp>
@@ -2523,6 +2535,7 @@
               <a:rPr lang="de-DE"/>
               <a:t>Bild durch Klicken auf Symbol hinzufügen</a:t>
             </a:r>
+            <a:endParaRPr lang="de-DE"/>
           </a:p>
         </p:txBody>
       </p:sp>
@@ -2588,6 +2601,7 @@
               <a:rPr lang="de-DE"/>
               <a:t>Textmasterformate durch Klicken bearbeiten</a:t>
             </a:r>
+            <a:endParaRPr lang="de-DE"/>
           </a:p>
         </p:txBody>
       </p:sp>
@@ -2653,7 +2667,7 @@
           <a:p>
             <a:endParaRPr lang="de-DE">
               <a:latin typeface="+mn-lt"/>
-              <a:cs typeface="Tahoma" panose="020B0604030504040204" pitchFamily="34" charset="0"/>
+              <a:cs typeface="Tahoma" panose="020B0804030504040204" pitchFamily="34" charset="0"/>
             </a:endParaRPr>
           </a:p>
         </p:txBody>
@@ -2692,6 +2706,7 @@
               <a:rPr lang="de-DE" dirty="0"/>
               <a:t>Titelmasterformat durch Klicken bearbeiten</a:t>
             </a:r>
+            <a:endParaRPr lang="de-DE" dirty="0"/>
           </a:p>
         </p:txBody>
       </p:sp>
@@ -2729,6 +2744,7 @@
               <a:rPr lang="de-DE" dirty="0"/>
               <a:t>Textmasterformate durch Klicken bearbeiten</a:t>
             </a:r>
+            <a:endParaRPr lang="de-DE" dirty="0"/>
           </a:p>
           <a:p>
             <a:pPr lvl="1"/>
@@ -2736,6 +2752,7 @@
               <a:rPr lang="de-DE" dirty="0"/>
               <a:t>Zweite Ebene</a:t>
             </a:r>
+            <a:endParaRPr lang="de-DE" dirty="0"/>
           </a:p>
           <a:p>
             <a:pPr lvl="2"/>
@@ -2743,6 +2760,7 @@
               <a:rPr lang="de-DE" dirty="0"/>
               <a:t>Dritte Ebene</a:t>
             </a:r>
+            <a:endParaRPr lang="de-DE" dirty="0"/>
           </a:p>
           <a:p>
             <a:pPr lvl="3"/>
@@ -2750,6 +2768,7 @@
               <a:rPr lang="de-DE" dirty="0"/>
               <a:t>Vierte Ebene</a:t>
             </a:r>
+            <a:endParaRPr lang="de-DE" dirty="0"/>
           </a:p>
           <a:p>
             <a:pPr lvl="4"/>
@@ -2757,6 +2776,7 @@
               <a:rPr lang="de-DE" dirty="0"/>
               <a:t>Fünfte Ebene</a:t>
             </a:r>
+            <a:endParaRPr lang="de-DE" dirty="0"/>
           </a:p>
         </p:txBody>
       </p:sp>
@@ -2790,7 +2810,7 @@
           <a:p>
             <a:endParaRPr lang="de-DE">
               <a:latin typeface="+mn-lt"/>
-              <a:cs typeface="Tahoma" panose="020B0604030504040204" pitchFamily="34" charset="0"/>
+              <a:cs typeface="Tahoma" panose="020B0804030504040204" pitchFamily="34" charset="0"/>
             </a:endParaRPr>
           </a:p>
         </p:txBody>
@@ -2804,7 +2824,7 @@
           <p:nvPr/>
         </p:nvPicPr>
         <p:blipFill>
-          <a:blip r:embed="rId10" cstate="print"/>
+          <a:blip r:embed="rId9" cstate="print"/>
           <a:srcRect r="5453"/>
           <a:stretch>
             <a:fillRect/>
@@ -2857,7 +2877,7 @@
           <a:p>
             <a:endParaRPr lang="de-DE">
               <a:latin typeface="+mn-lt"/>
-              <a:cs typeface="Tahoma" panose="020B0604030504040204" pitchFamily="34" charset="0"/>
+              <a:cs typeface="Tahoma" panose="020B0804030504040204" pitchFamily="34" charset="0"/>
             </a:endParaRPr>
           </a:p>
         </p:txBody>
@@ -2893,7 +2913,7 @@
           <a:p>
             <a:endParaRPr lang="de-DE">
               <a:latin typeface="+mn-lt"/>
-              <a:cs typeface="Tahoma" panose="020B0604030504040204" pitchFamily="34" charset="0"/>
+              <a:cs typeface="Tahoma" panose="020B0804030504040204" pitchFamily="34" charset="0"/>
             </a:endParaRPr>
           </a:p>
         </p:txBody>
@@ -2928,7 +2948,7 @@
           <a:p>
             <a:endParaRPr lang="de-DE">
               <a:latin typeface="+mn-lt"/>
-              <a:cs typeface="Tahoma" panose="020B0604030504040204" pitchFamily="34" charset="0"/>
+              <a:cs typeface="Tahoma" panose="020B0804030504040204" pitchFamily="34" charset="0"/>
             </a:endParaRPr>
           </a:p>
         </p:txBody>
@@ -2985,9 +3005,8 @@
                 <a:uFillTx/>
                 <a:latin typeface="+mn-lt"/>
                 <a:ea typeface="+mn-ea"/>
-                <a:cs typeface="Tahoma" panose="020B0604030504040204" pitchFamily="34" charset="0"/>
+                <a:cs typeface="Tahoma" panose="020B0804030504040204" pitchFamily="34" charset="0"/>
               </a:rPr>
-              <a:t>03.12.2019</a:t>
             </a:fld>
             <a:r>
               <a:rPr kumimoji="0" lang="de-DE" sz="1000" b="0" i="0" u="none" strike="noStrike" kern="1200" cap="none" spc="0" normalizeH="0" baseline="0" noProof="0" dirty="0">
@@ -3002,7 +3021,7 @@
                 <a:uFillTx/>
                 <a:latin typeface="+mn-lt"/>
                 <a:ea typeface="+mn-ea"/>
-                <a:cs typeface="Tahoma" panose="020B0604030504040204" pitchFamily="34" charset="0"/>
+                <a:cs typeface="Tahoma" panose="020B0804030504040204" pitchFamily="34" charset="0"/>
               </a:rPr>
               <a:t>  |  Fachbereich </a:t>
             </a:r>
@@ -3019,7 +3038,7 @@
                 <a:uFillTx/>
                 <a:latin typeface="+mn-lt"/>
                 <a:ea typeface="+mn-ea"/>
-                <a:cs typeface="Tahoma" panose="020B0604030504040204" pitchFamily="34" charset="0"/>
+                <a:cs typeface="Tahoma" panose="020B0804030504040204" pitchFamily="34" charset="0"/>
               </a:rPr>
               <a:t>20 </a:t>
             </a:r>
@@ -3036,7 +3055,7 @@
                 <a:uFillTx/>
                 <a:latin typeface="+mn-lt"/>
                 <a:ea typeface="+mn-ea"/>
-                <a:cs typeface="Tahoma" panose="020B0604030504040204" pitchFamily="34" charset="0"/>
+                <a:cs typeface="Tahoma" panose="020B0804030504040204" pitchFamily="34" charset="0"/>
               </a:rPr>
               <a:t>|  Institut </a:t>
             </a:r>
@@ -3049,7 +3068,7 @@
                 <a:uLnTx/>
                 <a:uFillTx/>
                 <a:latin typeface="+mn-lt"/>
-                <a:cs typeface="Tahoma" panose="020B0604030504040204" pitchFamily="34" charset="0"/>
+                <a:cs typeface="Tahoma" panose="020B0804030504040204" pitchFamily="34" charset="0"/>
                 <a:sym typeface="+mn-ea"/>
               </a:rPr>
               <a:t>Visual Inference La</a:t>
@@ -3063,7 +3082,7 @@
                 <a:uLnTx/>
                 <a:uFillTx/>
                 <a:latin typeface="+mn-lt"/>
-                <a:cs typeface="Tahoma" panose="020B0604030504040204" pitchFamily="34" charset="0"/>
+                <a:cs typeface="Tahoma" panose="020B0804030504040204" pitchFamily="34" charset="0"/>
                 <a:sym typeface="+mn-ea"/>
               </a:rPr>
               <a:t>b</a:t>
@@ -3077,7 +3096,7 @@
                 <a:uLnTx/>
                 <a:uFillTx/>
                 <a:latin typeface="+mn-lt"/>
-                <a:cs typeface="Tahoma" panose="020B0604030504040204" pitchFamily="34" charset="0"/>
+                <a:cs typeface="Tahoma" panose="020B0804030504040204" pitchFamily="34" charset="0"/>
                 <a:sym typeface="+mn-ea"/>
               </a:rPr>
               <a:t> </a:t>
@@ -3095,7 +3114,7 @@
                 <a:uFillTx/>
                 <a:latin typeface="+mn-lt"/>
                 <a:ea typeface="+mn-ea"/>
-                <a:cs typeface="Tahoma" panose="020B0604030504040204" pitchFamily="34" charset="0"/>
+                <a:cs typeface="Tahoma" panose="020B0804030504040204" pitchFamily="34" charset="0"/>
               </a:rPr>
               <a:t>|  Prof. </a:t>
             </a:r>
@@ -3112,7 +3131,7 @@
                 <a:uFillTx/>
                 <a:latin typeface="+mn-lt"/>
                 <a:ea typeface="+mn-ea"/>
-                <a:cs typeface="Tahoma" panose="020B0604030504040204" pitchFamily="34" charset="0"/>
+                <a:cs typeface="Tahoma" panose="020B0804030504040204" pitchFamily="34" charset="0"/>
               </a:rPr>
               <a:t>Stefan Roth </a:t>
             </a:r>
@@ -3129,7 +3148,7 @@
                 <a:uFillTx/>
                 <a:latin typeface="+mn-lt"/>
                 <a:ea typeface="+mn-ea"/>
-                <a:cs typeface="Tahoma" panose="020B0604030504040204" pitchFamily="34" charset="0"/>
+                <a:cs typeface="Tahoma" panose="020B0804030504040204" pitchFamily="34" charset="0"/>
               </a:rPr>
               <a:t>|  </a:t>
             </a:r>
@@ -3146,9 +3165,8 @@
                 <a:uFillTx/>
                 <a:latin typeface="+mn-lt"/>
                 <a:ea typeface="+mn-ea"/>
-                <a:cs typeface="Tahoma" panose="020B0604030504040204" pitchFamily="34" charset="0"/>
+                <a:cs typeface="Tahoma" panose="020B0804030504040204" pitchFamily="34" charset="0"/>
               </a:rPr>
-              <a:t>‹Nr.›</a:t>
             </a:fld>
             <a:endParaRPr kumimoji="0" lang="de-DE" sz="1000" b="0" i="0" u="none" strike="noStrike" kern="1200" cap="none" spc="0" normalizeH="0" baseline="0" noProof="0" dirty="0">
               <a:ln>
@@ -3162,7 +3180,7 @@
               <a:uFillTx/>
               <a:latin typeface="+mn-lt"/>
               <a:ea typeface="+mn-ea"/>
-              <a:cs typeface="Tahoma" panose="020B0604030504040204" pitchFamily="34" charset="0"/>
+              <a:cs typeface="Tahoma" panose="020B0804030504040204" pitchFamily="34" charset="0"/>
             </a:endParaRPr>
           </a:p>
           <a:p>
@@ -3194,7 +3212,7 @@
               <a:uFillTx/>
               <a:latin typeface="+mn-lt"/>
               <a:ea typeface="+mn-ea"/>
-              <a:cs typeface="Tahoma" panose="020B0604030504040204" pitchFamily="34" charset="0"/>
+              <a:cs typeface="Tahoma" panose="020B0804030504040204" pitchFamily="34" charset="0"/>
             </a:endParaRPr>
           </a:p>
         </p:txBody>
@@ -3208,7 +3226,7 @@
           <p:nvPr userDrawn="1"/>
         </p:nvPicPr>
         <p:blipFill>
-          <a:blip r:embed="rId11"/>
+          <a:blip r:embed="rId10"/>
           <a:stretch>
             <a:fillRect/>
           </a:stretch>
@@ -3252,7 +3270,7 @@
           </a:solidFill>
           <a:latin typeface="+mn-lt"/>
           <a:ea typeface="+mj-ea"/>
-          <a:cs typeface="Tahoma" panose="020B0604030504040204" pitchFamily="34" charset="0"/>
+          <a:cs typeface="Tahoma" panose="020B0804030504040204" pitchFamily="34" charset="0"/>
         </a:defRPr>
       </a:lvl1pPr>
       <a:lvl2pPr algn="l" rtl="0" eaLnBrk="1" fontAlgn="base" hangingPunct="1">
@@ -3266,7 +3284,7 @@
           <a:solidFill>
             <a:schemeClr val="tx1"/>
           </a:solidFill>
-          <a:latin typeface="Arial" panose="020B0604020202020204" pitchFamily="34" charset="0"/>
+          <a:latin typeface="Arial" panose="020B0604020202090204" pitchFamily="34" charset="0"/>
         </a:defRPr>
       </a:lvl2pPr>
       <a:lvl3pPr algn="l" rtl="0" eaLnBrk="1" fontAlgn="base" hangingPunct="1">
@@ -3280,7 +3298,7 @@
           <a:solidFill>
             <a:schemeClr val="tx1"/>
           </a:solidFill>
-          <a:latin typeface="Arial" panose="020B0604020202020204" pitchFamily="34" charset="0"/>
+          <a:latin typeface="Arial" panose="020B0604020202090204" pitchFamily="34" charset="0"/>
         </a:defRPr>
       </a:lvl3pPr>
       <a:lvl4pPr algn="l" rtl="0" eaLnBrk="1" fontAlgn="base" hangingPunct="1">
@@ -3294,7 +3312,7 @@
           <a:solidFill>
             <a:schemeClr val="tx1"/>
           </a:solidFill>
-          <a:latin typeface="Arial" panose="020B0604020202020204" pitchFamily="34" charset="0"/>
+          <a:latin typeface="Arial" panose="020B0604020202090204" pitchFamily="34" charset="0"/>
         </a:defRPr>
       </a:lvl4pPr>
       <a:lvl5pPr algn="l" rtl="0" eaLnBrk="1" fontAlgn="base" hangingPunct="1">
@@ -3308,7 +3326,7 @@
           <a:solidFill>
             <a:schemeClr val="tx1"/>
           </a:solidFill>
-          <a:latin typeface="Arial" panose="020B0604020202020204" pitchFamily="34" charset="0"/>
+          <a:latin typeface="Arial" panose="020B0604020202090204" pitchFamily="34" charset="0"/>
         </a:defRPr>
       </a:lvl5pPr>
       <a:lvl6pPr marL="457200" algn="l" rtl="0" eaLnBrk="1" fontAlgn="base" hangingPunct="1">
@@ -3322,7 +3340,7 @@
           <a:solidFill>
             <a:schemeClr val="tx1"/>
           </a:solidFill>
-          <a:latin typeface="Arial" panose="020B0604020202020204" pitchFamily="34" charset="0"/>
+          <a:latin typeface="Arial" panose="020B0604020202090204" pitchFamily="34" charset="0"/>
         </a:defRPr>
       </a:lvl6pPr>
       <a:lvl7pPr marL="914400" algn="l" rtl="0" eaLnBrk="1" fontAlgn="base" hangingPunct="1">
@@ -3336,7 +3354,7 @@
           <a:solidFill>
             <a:schemeClr val="tx1"/>
           </a:solidFill>
-          <a:latin typeface="Arial" panose="020B0604020202020204" pitchFamily="34" charset="0"/>
+          <a:latin typeface="Arial" panose="020B0604020202090204" pitchFamily="34" charset="0"/>
         </a:defRPr>
       </a:lvl7pPr>
       <a:lvl8pPr marL="1371600" algn="l" rtl="0" eaLnBrk="1" fontAlgn="base" hangingPunct="1">
@@ -3350,7 +3368,7 @@
           <a:solidFill>
             <a:schemeClr val="tx1"/>
           </a:solidFill>
-          <a:latin typeface="Arial" panose="020B0604020202020204" pitchFamily="34" charset="0"/>
+          <a:latin typeface="Arial" panose="020B0604020202090204" pitchFamily="34" charset="0"/>
         </a:defRPr>
       </a:lvl8pPr>
       <a:lvl9pPr marL="1828800" algn="l" rtl="0" eaLnBrk="1" fontAlgn="base" hangingPunct="1">
@@ -3364,7 +3382,7 @@
           <a:solidFill>
             <a:schemeClr val="tx1"/>
           </a:solidFill>
-          <a:latin typeface="Arial" panose="020B0604020202020204" pitchFamily="34" charset="0"/>
+          <a:latin typeface="Arial" panose="020B0604020202090204" pitchFamily="34" charset="0"/>
         </a:defRPr>
       </a:lvl9pPr>
     </p:titleStyle>
@@ -3387,7 +3405,7 @@
           </a:solidFill>
           <a:latin typeface="+mn-lt"/>
           <a:ea typeface="+mn-ea"/>
-          <a:cs typeface="Tahoma" panose="020B0604030504040204" pitchFamily="34" charset="0"/>
+          <a:cs typeface="Tahoma" panose="020B0804030504040204" pitchFamily="34" charset="0"/>
         </a:defRPr>
       </a:lvl1pPr>
       <a:lvl2pPr marL="179705" indent="-177800" algn="l" rtl="0" eaLnBrk="1" fontAlgn="base" hangingPunct="1">
@@ -3407,7 +3425,7 @@
             <a:schemeClr val="tx1"/>
           </a:solidFill>
           <a:latin typeface="+mn-lt"/>
-          <a:cs typeface="Tahoma" panose="020B0604030504040204" pitchFamily="34" charset="0"/>
+          <a:cs typeface="Tahoma" panose="020B0804030504040204" pitchFamily="34" charset="0"/>
         </a:defRPr>
       </a:lvl2pPr>
       <a:lvl3pPr marL="538480" indent="-187325" algn="l" rtl="0" eaLnBrk="1" fontAlgn="base" hangingPunct="1">
@@ -3427,7 +3445,7 @@
             <a:schemeClr val="tx1"/>
           </a:solidFill>
           <a:latin typeface="+mn-lt"/>
-          <a:cs typeface="Tahoma" panose="020B0604030504040204" pitchFamily="34" charset="0"/>
+          <a:cs typeface="Tahoma" panose="020B0804030504040204" pitchFamily="34" charset="0"/>
         </a:defRPr>
       </a:lvl3pPr>
       <a:lvl4pPr marL="717550" indent="-173355" algn="l" rtl="0" eaLnBrk="1" fontAlgn="base" hangingPunct="1">
@@ -3447,7 +3465,7 @@
             <a:schemeClr val="tx1"/>
           </a:solidFill>
           <a:latin typeface="+mn-lt"/>
-          <a:cs typeface="Tahoma" panose="020B0604030504040204" pitchFamily="34" charset="0"/>
+          <a:cs typeface="Tahoma" panose="020B0804030504040204" pitchFamily="34" charset="0"/>
         </a:defRPr>
       </a:lvl4pPr>
       <a:lvl5pPr marL="908050" indent="-189230" algn="l" rtl="0" eaLnBrk="1" fontAlgn="base" hangingPunct="1">
@@ -3467,7 +3485,7 @@
             <a:schemeClr val="tx1"/>
           </a:solidFill>
           <a:latin typeface="+mn-lt"/>
-          <a:cs typeface="Tahoma" panose="020B0604030504040204" pitchFamily="34" charset="0"/>
+          <a:cs typeface="Tahoma" panose="020B0804030504040204" pitchFamily="34" charset="0"/>
         </a:defRPr>
       </a:lvl5pPr>
       <a:lvl6pPr marL="1365250" indent="-189230" algn="l" rtl="0" eaLnBrk="1" fontAlgn="base" hangingPunct="1">
@@ -3730,9 +3748,42 @@
               <a:rPr lang="en-US" altLang="de-DE" dirty="0"/>
               <a:t>Piecewise monocular depth estimation by plane fitting</a:t>
             </a:r>
-          </a:p>
-        </p:txBody>
-      </p:sp>
+            <a:endParaRPr lang="en-US" altLang="de-DE" dirty="0"/>
+          </a:p>
+        </p:txBody>
+      </p:sp>
+      <p:pic>
+        <p:nvPicPr>
+          <p:cNvPr id="7" name="Content Placeholder 3"/>
+          <p:cNvPicPr>
+            <a:picLocks noChangeAspect="1"/>
+          </p:cNvPicPr>
+          <p:nvPr/>
+        </p:nvPicPr>
+        <p:blipFill>
+          <a:blip r:embed="rId1"/>
+          <a:stretch>
+            <a:fillRect/>
+          </a:stretch>
+        </p:blipFill>
+        <p:spPr>
+          <a:xfrm>
+            <a:off x="225425" y="3021965"/>
+            <a:ext cx="4284980" cy="2927985"/>
+          </a:xfrm>
+          <a:prstGeom prst="rect">
+            <a:avLst/>
+          </a:prstGeom>
+          <a:noFill/>
+          <a:ln w="9525">
+            <a:noFill/>
+            <a:miter lim="800000"/>
+            <a:headEnd/>
+            <a:tailEnd/>
+          </a:ln>
+          <a:effectLst/>
+        </p:spPr>
+      </p:pic>
     </p:spTree>
   </p:cSld>
   <p:clrMapOvr>
@@ -3760,13 +3811,7 @@
       </p:grpSpPr>
       <p:sp>
         <p:nvSpPr>
-          <p:cNvPr id="2" name="Titel 1">
-            <a:extLst>
-              <a:ext uri="{FF2B5EF4-FFF2-40B4-BE49-F238E27FC236}">
-                <a16:creationId xmlns:a16="http://schemas.microsoft.com/office/drawing/2014/main" id="{58F29F37-F576-48D7-A284-FDC5010F3983}"/>
-              </a:ext>
-            </a:extLst>
-          </p:cNvPr>
+          <p:cNvPr id="2" name="Titel 1"/>
           <p:cNvSpPr>
             <a:spLocks noGrp="1"/>
           </p:cNvSpPr>
@@ -3783,18 +3828,13 @@
               <a:rPr lang="de-DE" dirty="0"/>
               <a:t>Agenda</a:t>
             </a:r>
-          </a:p>
-        </p:txBody>
-      </p:sp>
-      <p:sp>
-        <p:nvSpPr>
-          <p:cNvPr id="3" name="Inhaltsplatzhalter 2">
-            <a:extLst>
-              <a:ext uri="{FF2B5EF4-FFF2-40B4-BE49-F238E27FC236}">
-                <a16:creationId xmlns:a16="http://schemas.microsoft.com/office/drawing/2014/main" id="{9CEAAB0E-5D5C-4129-936B-DFFA777604D2}"/>
-              </a:ext>
-            </a:extLst>
-          </p:cNvPr>
+            <a:endParaRPr lang="de-DE" dirty="0"/>
+          </a:p>
+        </p:txBody>
+      </p:sp>
+      <p:sp>
+        <p:nvSpPr>
+          <p:cNvPr id="3" name="Inhaltsplatzhalter 2"/>
           <p:cNvSpPr>
             <a:spLocks noGrp="1"/>
           </p:cNvSpPr>
@@ -3815,6 +3855,7 @@
               <a:rPr lang="en-US" dirty="0"/>
               <a:t>Overview incl. Goal</a:t>
             </a:r>
+            <a:endParaRPr lang="en-US" dirty="0"/>
           </a:p>
           <a:p>
             <a:pPr marL="457200" indent="-457200">
@@ -3825,6 +3866,7 @@
               <a:rPr lang="en-US" dirty="0"/>
               <a:t>History and Architecture</a:t>
             </a:r>
+            <a:endParaRPr lang="en-US" dirty="0"/>
           </a:p>
           <a:p>
             <a:pPr marL="457200" indent="-457200">
@@ -3846,6 +3888,7 @@
               <a:rPr lang="en-US" dirty="0"/>
               <a:t>Results</a:t>
             </a:r>
+            <a:endParaRPr lang="en-US" dirty="0"/>
           </a:p>
           <a:p>
             <a:pPr marL="457200" indent="-457200">
@@ -3856,6 +3899,7 @@
               <a:rPr lang="en-US" dirty="0"/>
               <a:t>Forecast and Approaches</a:t>
             </a:r>
+            <a:endParaRPr lang="en-US" dirty="0"/>
           </a:p>
           <a:p>
             <a:pPr marL="457200" indent="-457200">
@@ -3866,6 +3910,7 @@
               <a:rPr lang="en-US" dirty="0"/>
               <a:t>Review</a:t>
             </a:r>
+            <a:endParaRPr lang="en-US" dirty="0"/>
           </a:p>
           <a:p>
             <a:pPr marL="457200" indent="-457200">
@@ -3877,11 +3922,6 @@
         </p:txBody>
       </p:sp>
     </p:spTree>
-    <p:extLst>
-      <p:ext uri="{BB962C8B-B14F-4D97-AF65-F5344CB8AC3E}">
-        <p14:creationId xmlns:p14="http://schemas.microsoft.com/office/powerpoint/2010/main" val="3522290082"/>
-      </p:ext>
-    </p:extLst>
   </p:cSld>
   <p:clrMapOvr>
     <a:masterClrMapping/>
@@ -3908,13 +3948,7 @@
       </p:grpSpPr>
       <p:sp>
         <p:nvSpPr>
-          <p:cNvPr id="2" name="Titel 1">
-            <a:extLst>
-              <a:ext uri="{FF2B5EF4-FFF2-40B4-BE49-F238E27FC236}">
-                <a16:creationId xmlns:a16="http://schemas.microsoft.com/office/drawing/2014/main" id="{58F29F37-F576-48D7-A284-FDC5010F3983}"/>
-              </a:ext>
-            </a:extLst>
-          </p:cNvPr>
+          <p:cNvPr id="2" name="Titel 1"/>
           <p:cNvSpPr>
             <a:spLocks noGrp="1"/>
           </p:cNvSpPr>
@@ -3935,18 +3969,13 @@
               <a:rPr lang="en-US" dirty="0"/>
               <a:t>Overview incl. Goal</a:t>
             </a:r>
-          </a:p>
-        </p:txBody>
-      </p:sp>
-      <p:sp>
-        <p:nvSpPr>
-          <p:cNvPr id="3" name="Inhaltsplatzhalter 2">
-            <a:extLst>
-              <a:ext uri="{FF2B5EF4-FFF2-40B4-BE49-F238E27FC236}">
-                <a16:creationId xmlns:a16="http://schemas.microsoft.com/office/drawing/2014/main" id="{9CEAAB0E-5D5C-4129-936B-DFFA777604D2}"/>
-              </a:ext>
-            </a:extLst>
-          </p:cNvPr>
+            <a:endParaRPr lang="en-US" dirty="0"/>
+          </a:p>
+        </p:txBody>
+      </p:sp>
+      <p:sp>
+        <p:nvSpPr>
+          <p:cNvPr id="3" name="Inhaltsplatzhalter 2"/>
           <p:cNvSpPr>
             <a:spLocks noGrp="1"/>
           </p:cNvSpPr>
@@ -4024,15 +4053,11 @@
               <a:rPr lang="de-DE" dirty="0"/>
               <a:t> Normals</a:t>
             </a:r>
+            <a:endParaRPr lang="de-DE" dirty="0"/>
           </a:p>
         </p:txBody>
       </p:sp>
     </p:spTree>
-    <p:extLst>
-      <p:ext uri="{BB962C8B-B14F-4D97-AF65-F5344CB8AC3E}">
-        <p14:creationId xmlns:p14="http://schemas.microsoft.com/office/powerpoint/2010/main" val="2941801096"/>
-      </p:ext>
-    </p:extLst>
   </p:cSld>
   <p:clrMapOvr>
     <a:masterClrMapping/>
@@ -4059,13 +4084,7 @@
       </p:grpSpPr>
       <p:sp>
         <p:nvSpPr>
-          <p:cNvPr id="2" name="Titel 1">
-            <a:extLst>
-              <a:ext uri="{FF2B5EF4-FFF2-40B4-BE49-F238E27FC236}">
-                <a16:creationId xmlns:a16="http://schemas.microsoft.com/office/drawing/2014/main" id="{58F29F37-F576-48D7-A284-FDC5010F3983}"/>
-              </a:ext>
-            </a:extLst>
-          </p:cNvPr>
+          <p:cNvPr id="2" name="Titel 1"/>
           <p:cNvSpPr>
             <a:spLocks noGrp="1"/>
           </p:cNvSpPr>
@@ -4086,18 +4105,13 @@
               <a:rPr lang="en-US" dirty="0"/>
               <a:t>History and Architecture </a:t>
             </a:r>
-          </a:p>
-        </p:txBody>
-      </p:sp>
-      <p:sp>
-        <p:nvSpPr>
-          <p:cNvPr id="3" name="Inhaltsplatzhalter 2">
-            <a:extLst>
-              <a:ext uri="{FF2B5EF4-FFF2-40B4-BE49-F238E27FC236}">
-                <a16:creationId xmlns:a16="http://schemas.microsoft.com/office/drawing/2014/main" id="{9CEAAB0E-5D5C-4129-936B-DFFA777604D2}"/>
-              </a:ext>
-            </a:extLst>
-          </p:cNvPr>
+            <a:endParaRPr lang="en-US" dirty="0"/>
+          </a:p>
+        </p:txBody>
+      </p:sp>
+      <p:sp>
+        <p:nvSpPr>
+          <p:cNvPr id="3" name="Inhaltsplatzhalter 2"/>
           <p:cNvSpPr>
             <a:spLocks noGrp="1"/>
           </p:cNvSpPr>
@@ -4147,11 +4161,6 @@
         </p:txBody>
       </p:sp>
     </p:spTree>
-    <p:extLst>
-      <p:ext uri="{BB962C8B-B14F-4D97-AF65-F5344CB8AC3E}">
-        <p14:creationId xmlns:p14="http://schemas.microsoft.com/office/powerpoint/2010/main" val="2544720649"/>
-      </p:ext>
-    </p:extLst>
   </p:cSld>
   <p:clrMapOvr>
     <a:masterClrMapping/>
@@ -4178,13 +4187,7 @@
       </p:grpSpPr>
       <p:sp>
         <p:nvSpPr>
-          <p:cNvPr id="2" name="Titel 1">
-            <a:extLst>
-              <a:ext uri="{FF2B5EF4-FFF2-40B4-BE49-F238E27FC236}">
-                <a16:creationId xmlns:a16="http://schemas.microsoft.com/office/drawing/2014/main" id="{58F29F37-F576-48D7-A284-FDC5010F3983}"/>
-              </a:ext>
-            </a:extLst>
-          </p:cNvPr>
+          <p:cNvPr id="2" name="Titel 1"/>
           <p:cNvSpPr>
             <a:spLocks noGrp="1"/>
           </p:cNvSpPr>
@@ -4211,13 +4214,7 @@
       </p:sp>
       <p:sp>
         <p:nvSpPr>
-          <p:cNvPr id="3" name="Inhaltsplatzhalter 2">
-            <a:extLst>
-              <a:ext uri="{FF2B5EF4-FFF2-40B4-BE49-F238E27FC236}">
-                <a16:creationId xmlns:a16="http://schemas.microsoft.com/office/drawing/2014/main" id="{9CEAAB0E-5D5C-4129-936B-DFFA777604D2}"/>
-              </a:ext>
-            </a:extLst>
-          </p:cNvPr>
+          <p:cNvPr id="3" name="Inhaltsplatzhalter 2"/>
           <p:cNvSpPr>
             <a:spLocks noGrp="1"/>
           </p:cNvSpPr>
@@ -4239,6 +4236,11 @@
               </a:rPr>
               <a:t>Helge</a:t>
             </a:r>
+            <a:endParaRPr lang="en-US" dirty="0">
+              <a:solidFill>
+                <a:srgbClr val="FF0000"/>
+              </a:solidFill>
+            </a:endParaRPr>
           </a:p>
           <a:p>
             <a:pPr marL="457200" indent="-457200">
@@ -4250,11 +4252,6 @@
         </p:txBody>
       </p:sp>
     </p:spTree>
-    <p:extLst>
-      <p:ext uri="{BB962C8B-B14F-4D97-AF65-F5344CB8AC3E}">
-        <p14:creationId xmlns:p14="http://schemas.microsoft.com/office/powerpoint/2010/main" val="1602724363"/>
-      </p:ext>
-    </p:extLst>
   </p:cSld>
   <p:clrMapOvr>
     <a:masterClrMapping/>
@@ -4281,13 +4278,7 @@
       </p:grpSpPr>
       <p:sp>
         <p:nvSpPr>
-          <p:cNvPr id="2" name="Titel 1">
-            <a:extLst>
-              <a:ext uri="{FF2B5EF4-FFF2-40B4-BE49-F238E27FC236}">
-                <a16:creationId xmlns:a16="http://schemas.microsoft.com/office/drawing/2014/main" id="{58F29F37-F576-48D7-A284-FDC5010F3983}"/>
-              </a:ext>
-            </a:extLst>
-          </p:cNvPr>
+          <p:cNvPr id="2" name="Titel 1"/>
           <p:cNvSpPr>
             <a:spLocks noGrp="1"/>
           </p:cNvSpPr>
@@ -4308,18 +4299,13 @@
               <a:rPr lang="en-US" dirty="0"/>
               <a:t>Results</a:t>
             </a:r>
-          </a:p>
-        </p:txBody>
-      </p:sp>
-      <p:sp>
-        <p:nvSpPr>
-          <p:cNvPr id="3" name="Inhaltsplatzhalter 2">
-            <a:extLst>
-              <a:ext uri="{FF2B5EF4-FFF2-40B4-BE49-F238E27FC236}">
-                <a16:creationId xmlns:a16="http://schemas.microsoft.com/office/drawing/2014/main" id="{9CEAAB0E-5D5C-4129-936B-DFFA777604D2}"/>
-              </a:ext>
-            </a:extLst>
-          </p:cNvPr>
+            <a:endParaRPr lang="en-US" dirty="0"/>
+          </a:p>
+        </p:txBody>
+      </p:sp>
+      <p:sp>
+        <p:nvSpPr>
+          <p:cNvPr id="3" name="Inhaltsplatzhalter 2"/>
           <p:cNvSpPr>
             <a:spLocks noGrp="1"/>
           </p:cNvSpPr>
@@ -4349,6 +4335,11 @@
               </a:rPr>
               <a:t> und Helge</a:t>
             </a:r>
+            <a:endParaRPr lang="en-US" dirty="0">
+              <a:solidFill>
+                <a:srgbClr val="FF0000"/>
+              </a:solidFill>
+            </a:endParaRPr>
           </a:p>
           <a:p>
             <a:pPr marL="457200" indent="-457200">
@@ -4360,11 +4351,6 @@
         </p:txBody>
       </p:sp>
     </p:spTree>
-    <p:extLst>
-      <p:ext uri="{BB962C8B-B14F-4D97-AF65-F5344CB8AC3E}">
-        <p14:creationId xmlns:p14="http://schemas.microsoft.com/office/powerpoint/2010/main" val="2354355038"/>
-      </p:ext>
-    </p:extLst>
   </p:cSld>
   <p:clrMapOvr>
     <a:masterClrMapping/>
@@ -4391,13 +4377,7 @@
       </p:grpSpPr>
       <p:sp>
         <p:nvSpPr>
-          <p:cNvPr id="2" name="Titel 1">
-            <a:extLst>
-              <a:ext uri="{FF2B5EF4-FFF2-40B4-BE49-F238E27FC236}">
-                <a16:creationId xmlns:a16="http://schemas.microsoft.com/office/drawing/2014/main" id="{58F29F37-F576-48D7-A284-FDC5010F3983}"/>
-              </a:ext>
-            </a:extLst>
-          </p:cNvPr>
+          <p:cNvPr id="2" name="Titel 1"/>
           <p:cNvSpPr>
             <a:spLocks noGrp="1"/>
           </p:cNvSpPr>
@@ -4418,18 +4398,13 @@
               <a:rPr lang="en-US" dirty="0"/>
               <a:t>Forecast and Approaches</a:t>
             </a:r>
-          </a:p>
-        </p:txBody>
-      </p:sp>
-      <p:sp>
-        <p:nvSpPr>
-          <p:cNvPr id="3" name="Inhaltsplatzhalter 2">
-            <a:extLst>
-              <a:ext uri="{FF2B5EF4-FFF2-40B4-BE49-F238E27FC236}">
-                <a16:creationId xmlns:a16="http://schemas.microsoft.com/office/drawing/2014/main" id="{9CEAAB0E-5D5C-4129-936B-DFFA777604D2}"/>
-              </a:ext>
-            </a:extLst>
-          </p:cNvPr>
+            <a:endParaRPr lang="en-US" dirty="0"/>
+          </a:p>
+        </p:txBody>
+      </p:sp>
+      <p:sp>
+        <p:nvSpPr>
+          <p:cNvPr id="3" name="Inhaltsplatzhalter 2"/>
           <p:cNvSpPr>
             <a:spLocks noGrp="1"/>
           </p:cNvSpPr>
@@ -4463,15 +4438,15 @@
               </a:rPr>
               <a:t> Jan</a:t>
             </a:r>
+            <a:endParaRPr lang="de-DE" dirty="0">
+              <a:solidFill>
+                <a:srgbClr val="FF0000"/>
+              </a:solidFill>
+            </a:endParaRPr>
           </a:p>
         </p:txBody>
       </p:sp>
     </p:spTree>
-    <p:extLst>
-      <p:ext uri="{BB962C8B-B14F-4D97-AF65-F5344CB8AC3E}">
-        <p14:creationId xmlns:p14="http://schemas.microsoft.com/office/powerpoint/2010/main" val="3254942594"/>
-      </p:ext>
-    </p:extLst>
   </p:cSld>
   <p:clrMapOvr>
     <a:masterClrMapping/>
@@ -4498,13 +4473,7 @@
       </p:grpSpPr>
       <p:sp>
         <p:nvSpPr>
-          <p:cNvPr id="2" name="Titel 1">
-            <a:extLst>
-              <a:ext uri="{FF2B5EF4-FFF2-40B4-BE49-F238E27FC236}">
-                <a16:creationId xmlns:a16="http://schemas.microsoft.com/office/drawing/2014/main" id="{58F29F37-F576-48D7-A284-FDC5010F3983}"/>
-              </a:ext>
-            </a:extLst>
-          </p:cNvPr>
+          <p:cNvPr id="2" name="Titel 1"/>
           <p:cNvSpPr>
             <a:spLocks noGrp="1"/>
           </p:cNvSpPr>
@@ -4525,18 +4494,13 @@
               <a:rPr lang="en-US" dirty="0"/>
               <a:t>Review</a:t>
             </a:r>
-          </a:p>
-        </p:txBody>
-      </p:sp>
-      <p:sp>
-        <p:nvSpPr>
-          <p:cNvPr id="3" name="Inhaltsplatzhalter 2">
-            <a:extLst>
-              <a:ext uri="{FF2B5EF4-FFF2-40B4-BE49-F238E27FC236}">
-                <a16:creationId xmlns:a16="http://schemas.microsoft.com/office/drawing/2014/main" id="{9CEAAB0E-5D5C-4129-936B-DFFA777604D2}"/>
-              </a:ext>
-            </a:extLst>
-          </p:cNvPr>
+            <a:endParaRPr lang="en-US" dirty="0"/>
+          </a:p>
+        </p:txBody>
+      </p:sp>
+      <p:sp>
+        <p:nvSpPr>
+          <p:cNvPr id="3" name="Inhaltsplatzhalter 2"/>
           <p:cNvSpPr>
             <a:spLocks noGrp="1"/>
           </p:cNvSpPr>
@@ -4724,11 +4688,6 @@
         </p:txBody>
       </p:sp>
     </p:spTree>
-    <p:extLst>
-      <p:ext uri="{BB962C8B-B14F-4D97-AF65-F5344CB8AC3E}">
-        <p14:creationId xmlns:p14="http://schemas.microsoft.com/office/powerpoint/2010/main" val="1978807905"/>
-      </p:ext>
-    </p:extLst>
   </p:cSld>
   <p:clrMapOvr>
     <a:masterClrMapping/>
@@ -4956,7 +4915,6 @@
       </a:bgFillStyleLst>
     </a:fmtScheme>
   </a:themeElements>
-  <a:objectDefaults/>
   <a:extraClrSchemeLst>
     <a:extraClrScheme>
       <a:clrScheme name="v1_TUD_Präsentation_rot 1">
@@ -5737,8 +5695,6 @@
       </a:bgFillStyleLst>
     </a:fmtScheme>
   </a:themeElements>
-  <a:objectDefaults/>
-  <a:extraClrSchemeLst/>
   <a:extLst>
     <a:ext uri="{05A4C25C-085E-4340-85A3-A5531E510DB2}">
       <thm15:themeFamily xmlns:thm15="http://schemas.microsoft.com/office/thememl/2012/main" name="Office Theme" id="{62F939B6-93AF-4DB8-9C6B-D6C7DFDC589F}" vid="{4A3C46E8-61CC-4603-A589-7422A47A8E4A}"/>
@@ -6025,8 +5981,6 @@
       </a:bgFillStyleLst>
     </a:fmtScheme>
   </a:themeElements>
-  <a:objectDefaults/>
-  <a:extraClrSchemeLst/>
   <a:extLst>
     <a:ext uri="{05A4C25C-085E-4340-85A3-A5531E510DB2}">
       <thm15:themeFamily xmlns:thm15="http://schemas.microsoft.com/office/thememl/2012/main" name="Office Theme" id="{62F939B6-93AF-4DB8-9C6B-D6C7DFDC589F}" vid="{4A3C46E8-61CC-4603-A589-7422A47A8E4A}"/>

</xml_diff>